<commit_message>
Add lab 07, and slides.
</commit_message>
<xml_diff>
--- a/bishops/cs321/resources/CS321_Lecture_13.pptx
+++ b/bishops/cs321/resources/CS321_Lecture_13.pptx
@@ -113,7 +113,7 @@
   </p:defaultTextStyle>
   <p:extLst>
     <p:ext uri="{EFAFB233-063F-42B5-8137-9DF3F51BA10A}">
-      <p15:sldGuideLst xmlns:p15="http://schemas.microsoft.com/office/powerpoint/2012/main"/>
+      <p15:sldGuideLst xmlns:p15="http://schemas.microsoft.com/office/powerpoint/2012/main" xmlns=""/>
     </p:ext>
   </p:extLst>
 </p:presentation>
@@ -124,7 +124,7 @@
   <p:cmAuthor id="1" name="Gregory" initials="G" lastIdx="1" clrIdx="0">
     <p:extLst>
       <p:ext uri="{19B8F6BF-5375-455C-9EA6-DF929625EA0E}">
-        <p15:presenceInfo xmlns:p15="http://schemas.microsoft.com/office/powerpoint/2012/main" userId="Gregory" providerId="None"/>
+        <p15:presenceInfo xmlns:p15="http://schemas.microsoft.com/office/powerpoint/2012/main" xmlns="" userId="Gregory" providerId="None"/>
       </p:ext>
     </p:extLst>
   </p:cmAuthor>
@@ -213,7 +213,8 @@
           <a:p>
             <a:fld id="{A6583E9D-07AB-4C6D-BFD0-47E805C6B3D4}" type="datetimeFigureOut">
               <a:rPr lang="en-CA" smtClean="0"/>
-              <a:t>2022-03-07</a:t>
+              <a:pPr/>
+              <a:t>2024-03-08</a:t>
             </a:fld>
             <a:endParaRPr lang="en-CA"/>
           </a:p>
@@ -372,6 +373,7 @@
           <a:p>
             <a:fld id="{8F20841C-25C9-4C0C-A7FA-C4A363D14F5A}" type="slidenum">
               <a:rPr lang="en-CA" smtClean="0"/>
+              <a:pPr/>
               <a:t>‹#›</a:t>
             </a:fld>
             <a:endParaRPr lang="en-CA"/>
@@ -381,7 +383,7 @@
     </p:spTree>
     <p:extLst>
       <p:ext uri="{BB962C8B-B14F-4D97-AF65-F5344CB8AC3E}">
-        <p14:creationId xmlns:p14="http://schemas.microsoft.com/office/powerpoint/2010/main" val="4237529172"/>
+        <p14:creationId xmlns:p14="http://schemas.microsoft.com/office/powerpoint/2010/main" xmlns="" val="4237529172"/>
       </p:ext>
     </p:extLst>
   </p:cSld>
@@ -525,14 +527,6 @@
           <a:bodyPr/>
           <a:lstStyle/>
           <a:p>
-            <a:r>
-              <a:rPr lang="en-CA" dirty="0"/>
-              <a:t>Multi-instrument</a:t>
-            </a:r>
-            <a:r>
-              <a:rPr lang="en-CA" baseline="0" dirty="0"/>
-              <a:t> / Multi-instrument Inter-process (minus the)-with Eye Trackers-</a:t>
-            </a:r>
             <a:endParaRPr lang="en-CA" dirty="0"/>
           </a:p>
         </p:txBody>
@@ -554,6 +548,7 @@
           <a:p>
             <a:fld id="{8F20841C-25C9-4C0C-A7FA-C4A363D14F5A}" type="slidenum">
               <a:rPr lang="en-CA" smtClean="0"/>
+              <a:pPr/>
               <a:t>1</a:t>
             </a:fld>
             <a:endParaRPr lang="en-CA"/>
@@ -563,7 +558,7 @@
     </p:spTree>
     <p:extLst>
       <p:ext uri="{BB962C8B-B14F-4D97-AF65-F5344CB8AC3E}">
-        <p14:creationId xmlns:p14="http://schemas.microsoft.com/office/powerpoint/2010/main" val="2340334442"/>
+        <p14:creationId xmlns:p14="http://schemas.microsoft.com/office/powerpoint/2010/main" xmlns="" val="2340334442"/>
       </p:ext>
     </p:extLst>
   </p:cSld>
@@ -638,6 +633,7 @@
           <a:p>
             <a:fld id="{8F20841C-25C9-4C0C-A7FA-C4A363D14F5A}" type="slidenum">
               <a:rPr lang="en-CA" smtClean="0"/>
+              <a:pPr/>
               <a:t>3</a:t>
             </a:fld>
             <a:endParaRPr lang="en-CA"/>
@@ -647,7 +643,7 @@
     </p:spTree>
     <p:extLst>
       <p:ext uri="{BB962C8B-B14F-4D97-AF65-F5344CB8AC3E}">
-        <p14:creationId xmlns:p14="http://schemas.microsoft.com/office/powerpoint/2010/main" val="3843431781"/>
+        <p14:creationId xmlns:p14="http://schemas.microsoft.com/office/powerpoint/2010/main" xmlns="" val="3843431781"/>
       </p:ext>
     </p:extLst>
   </p:cSld>
@@ -722,6 +718,7 @@
           <a:p>
             <a:fld id="{8F20841C-25C9-4C0C-A7FA-C4A363D14F5A}" type="slidenum">
               <a:rPr lang="en-CA" smtClean="0"/>
+              <a:pPr/>
               <a:t>4</a:t>
             </a:fld>
             <a:endParaRPr lang="en-CA"/>
@@ -731,7 +728,7 @@
     </p:spTree>
     <p:extLst>
       <p:ext uri="{BB962C8B-B14F-4D97-AF65-F5344CB8AC3E}">
-        <p14:creationId xmlns:p14="http://schemas.microsoft.com/office/powerpoint/2010/main" val="3902417096"/>
+        <p14:creationId xmlns:p14="http://schemas.microsoft.com/office/powerpoint/2010/main" xmlns="" val="3902417096"/>
       </p:ext>
     </p:extLst>
   </p:cSld>
@@ -806,6 +803,7 @@
           <a:p>
             <a:fld id="{8F20841C-25C9-4C0C-A7FA-C4A363D14F5A}" type="slidenum">
               <a:rPr lang="en-CA" smtClean="0"/>
+              <a:pPr/>
               <a:t>5</a:t>
             </a:fld>
             <a:endParaRPr lang="en-CA"/>
@@ -815,7 +813,7 @@
     </p:spTree>
     <p:extLst>
       <p:ext uri="{BB962C8B-B14F-4D97-AF65-F5344CB8AC3E}">
-        <p14:creationId xmlns:p14="http://schemas.microsoft.com/office/powerpoint/2010/main" val="3815887795"/>
+        <p14:creationId xmlns:p14="http://schemas.microsoft.com/office/powerpoint/2010/main" xmlns="" val="3815887795"/>
       </p:ext>
     </p:extLst>
   </p:cSld>
@@ -1009,6 +1007,7 @@
           <a:p>
             <a:fld id="{5174927E-2439-42C0-9720-7BBCA09BF46F}" type="slidenum">
               <a:rPr lang="en-CA" smtClean="0"/>
+              <a:pPr/>
               <a:t>‹#›</a:t>
             </a:fld>
             <a:endParaRPr lang="en-CA"/>
@@ -1018,7 +1017,7 @@
     </p:spTree>
     <p:extLst>
       <p:ext uri="{BB962C8B-B14F-4D97-AF65-F5344CB8AC3E}">
-        <p14:creationId xmlns:p14="http://schemas.microsoft.com/office/powerpoint/2010/main" val="1900560834"/>
+        <p14:creationId xmlns:p14="http://schemas.microsoft.com/office/powerpoint/2010/main" xmlns="" val="1900560834"/>
       </p:ext>
     </p:extLst>
   </p:cSld>
@@ -1182,6 +1181,7 @@
           <a:p>
             <a:fld id="{5174927E-2439-42C0-9720-7BBCA09BF46F}" type="slidenum">
               <a:rPr lang="en-CA" smtClean="0"/>
+              <a:pPr/>
               <a:t>‹#›</a:t>
             </a:fld>
             <a:endParaRPr lang="en-CA"/>
@@ -1191,7 +1191,7 @@
     </p:spTree>
     <p:extLst>
       <p:ext uri="{BB962C8B-B14F-4D97-AF65-F5344CB8AC3E}">
-        <p14:creationId xmlns:p14="http://schemas.microsoft.com/office/powerpoint/2010/main" val="3722958745"/>
+        <p14:creationId xmlns:p14="http://schemas.microsoft.com/office/powerpoint/2010/main" xmlns="" val="3722958745"/>
       </p:ext>
     </p:extLst>
   </p:cSld>
@@ -1427,7 +1427,7 @@
     </p:spTree>
     <p:extLst>
       <p:ext uri="{BB962C8B-B14F-4D97-AF65-F5344CB8AC3E}">
-        <p14:creationId xmlns:p14="http://schemas.microsoft.com/office/powerpoint/2010/main" val="1822376042"/>
+        <p14:creationId xmlns:p14="http://schemas.microsoft.com/office/powerpoint/2010/main" xmlns="" val="1822376042"/>
       </p:ext>
     </p:extLst>
   </p:cSld>
@@ -1667,6 +1667,7 @@
           <a:p>
             <a:fld id="{5174927E-2439-42C0-9720-7BBCA09BF46F}" type="slidenum">
               <a:rPr lang="en-CA" smtClean="0"/>
+              <a:pPr/>
               <a:t>‹#›</a:t>
             </a:fld>
             <a:endParaRPr lang="en-CA"/>
@@ -1676,7 +1677,7 @@
     </p:spTree>
     <p:extLst>
       <p:ext uri="{BB962C8B-B14F-4D97-AF65-F5344CB8AC3E}">
-        <p14:creationId xmlns:p14="http://schemas.microsoft.com/office/powerpoint/2010/main" val="3411672561"/>
+        <p14:creationId xmlns:p14="http://schemas.microsoft.com/office/powerpoint/2010/main" xmlns="" val="3411672561"/>
       </p:ext>
     </p:extLst>
   </p:cSld>
@@ -1902,6 +1903,7 @@
           <a:p>
             <a:fld id="{5174927E-2439-42C0-9720-7BBCA09BF46F}" type="slidenum">
               <a:rPr lang="en-CA" smtClean="0"/>
+              <a:pPr/>
               <a:t>‹#›</a:t>
             </a:fld>
             <a:endParaRPr lang="en-CA"/>
@@ -1911,7 +1913,7 @@
     </p:spTree>
     <p:extLst>
       <p:ext uri="{BB962C8B-B14F-4D97-AF65-F5344CB8AC3E}">
-        <p14:creationId xmlns:p14="http://schemas.microsoft.com/office/powerpoint/2010/main" val="1093008526"/>
+        <p14:creationId xmlns:p14="http://schemas.microsoft.com/office/powerpoint/2010/main" xmlns="" val="1093008526"/>
       </p:ext>
     </p:extLst>
   </p:cSld>
@@ -2272,6 +2274,7 @@
           <a:p>
             <a:fld id="{5174927E-2439-42C0-9720-7BBCA09BF46F}" type="slidenum">
               <a:rPr lang="en-CA" smtClean="0"/>
+              <a:pPr/>
               <a:t>‹#›</a:t>
             </a:fld>
             <a:endParaRPr lang="en-CA"/>
@@ -2281,7 +2284,7 @@
     </p:spTree>
     <p:extLst>
       <p:ext uri="{BB962C8B-B14F-4D97-AF65-F5344CB8AC3E}">
-        <p14:creationId xmlns:p14="http://schemas.microsoft.com/office/powerpoint/2010/main" val="1087924878"/>
+        <p14:creationId xmlns:p14="http://schemas.microsoft.com/office/powerpoint/2010/main" xmlns="" val="1087924878"/>
       </p:ext>
     </p:extLst>
   </p:cSld>
@@ -2393,6 +2396,7 @@
           <a:p>
             <a:fld id="{5174927E-2439-42C0-9720-7BBCA09BF46F}" type="slidenum">
               <a:rPr lang="en-CA" smtClean="0"/>
+              <a:pPr/>
               <a:t>‹#›</a:t>
             </a:fld>
             <a:endParaRPr lang="en-CA"/>
@@ -2402,7 +2406,7 @@
     </p:spTree>
     <p:extLst>
       <p:ext uri="{BB962C8B-B14F-4D97-AF65-F5344CB8AC3E}">
-        <p14:creationId xmlns:p14="http://schemas.microsoft.com/office/powerpoint/2010/main" val="3802387408"/>
+        <p14:creationId xmlns:p14="http://schemas.microsoft.com/office/powerpoint/2010/main" xmlns="" val="3802387408"/>
       </p:ext>
     </p:extLst>
   </p:cSld>
@@ -2491,6 +2495,7 @@
           <a:p>
             <a:fld id="{5174927E-2439-42C0-9720-7BBCA09BF46F}" type="slidenum">
               <a:rPr lang="en-CA" smtClean="0"/>
+              <a:pPr/>
               <a:t>‹#›</a:t>
             </a:fld>
             <a:endParaRPr lang="en-CA"/>
@@ -2500,7 +2505,7 @@
     </p:spTree>
     <p:extLst>
       <p:ext uri="{BB962C8B-B14F-4D97-AF65-F5344CB8AC3E}">
-        <p14:creationId xmlns:p14="http://schemas.microsoft.com/office/powerpoint/2010/main" val="4234091411"/>
+        <p14:creationId xmlns:p14="http://schemas.microsoft.com/office/powerpoint/2010/main" xmlns="" val="4234091411"/>
       </p:ext>
     </p:extLst>
   </p:cSld>
@@ -2771,6 +2776,7 @@
           <a:p>
             <a:fld id="{5174927E-2439-42C0-9720-7BBCA09BF46F}" type="slidenum">
               <a:rPr lang="en-CA" smtClean="0"/>
+              <a:pPr/>
               <a:t>‹#›</a:t>
             </a:fld>
             <a:endParaRPr lang="en-CA"/>
@@ -2780,7 +2786,7 @@
     </p:spTree>
     <p:extLst>
       <p:ext uri="{BB962C8B-B14F-4D97-AF65-F5344CB8AC3E}">
-        <p14:creationId xmlns:p14="http://schemas.microsoft.com/office/powerpoint/2010/main" val="4189422420"/>
+        <p14:creationId xmlns:p14="http://schemas.microsoft.com/office/powerpoint/2010/main" xmlns="" val="4189422420"/>
       </p:ext>
     </p:extLst>
   </p:cSld>
@@ -3027,6 +3033,7 @@
           <a:p>
             <a:fld id="{5174927E-2439-42C0-9720-7BBCA09BF46F}" type="slidenum">
               <a:rPr lang="en-CA" smtClean="0"/>
+              <a:pPr/>
               <a:t>‹#›</a:t>
             </a:fld>
             <a:endParaRPr lang="en-CA"/>
@@ -3036,7 +3043,7 @@
     </p:spTree>
     <p:extLst>
       <p:ext uri="{BB962C8B-B14F-4D97-AF65-F5344CB8AC3E}">
-        <p14:creationId xmlns:p14="http://schemas.microsoft.com/office/powerpoint/2010/main" val="3252977898"/>
+        <p14:creationId xmlns:p14="http://schemas.microsoft.com/office/powerpoint/2010/main" xmlns="" val="3252977898"/>
       </p:ext>
     </p:extLst>
   </p:cSld>
@@ -3302,10 +3309,10 @@
           <p:nvPr userDrawn="1"/>
         </p:nvPicPr>
         <p:blipFill>
-          <a:blip r:embed="rId13">
+          <a:blip r:embed="rId13" cstate="print">
             <a:extLst>
               <a:ext uri="{28A0092B-C50C-407E-A947-70E740481C1C}">
-                <a14:useLocalDpi xmlns:a14="http://schemas.microsoft.com/office/drawing/2010/main" val="0"/>
+                <a14:useLocalDpi xmlns:a14="http://schemas.microsoft.com/office/drawing/2010/main" xmlns="" val="0"/>
               </a:ext>
             </a:extLst>
           </a:blip>
@@ -3326,7 +3333,7 @@
     </p:spTree>
     <p:extLst>
       <p:ext uri="{BB962C8B-B14F-4D97-AF65-F5344CB8AC3E}">
-        <p14:creationId xmlns:p14="http://schemas.microsoft.com/office/powerpoint/2010/main" val="4230061028"/>
+        <p14:creationId xmlns:p14="http://schemas.microsoft.com/office/powerpoint/2010/main" xmlns="" val="4230061028"/>
       </p:ext>
     </p:extLst>
   </p:cSld>
@@ -3760,12 +3767,6 @@
             <a:endParaRPr lang="en-CA" baseline="30000" dirty="0"/>
           </a:p>
           <a:p>
-            <a:r>
-              <a:rPr lang="en-CA" dirty="0"/>
-              <a:t>Date: January 31, 2022</a:t>
-            </a:r>
-          </a:p>
-          <a:p>
             <a:endParaRPr lang="en-CA" dirty="0"/>
           </a:p>
         </p:txBody>
@@ -3775,7 +3776,7 @@
           <p:cNvPr id="13" name="Picture 8" descr="http://osiris.ubishops.ca/~alussier/images/transparentlogo_bu.png">
             <a:extLst>
               <a:ext uri="{FF2B5EF4-FFF2-40B4-BE49-F238E27FC236}">
-                <a16:creationId xmlns:a16="http://schemas.microsoft.com/office/drawing/2014/main" id="{CCB9A035-2F1C-4B96-A5DB-70B72D6E4AD8}"/>
+                <a16:creationId xmlns:a16="http://schemas.microsoft.com/office/drawing/2014/main" xmlns="" id="{CCB9A035-2F1C-4B96-A5DB-70B72D6E4AD8}"/>
               </a:ext>
             </a:extLst>
           </p:cNvPr>
@@ -3785,10 +3786,10 @@
           <p:nvPr/>
         </p:nvPicPr>
         <p:blipFill>
-          <a:blip r:embed="rId3">
+          <a:blip r:embed="rId3" cstate="print">
             <a:extLst>
               <a:ext uri="{28A0092B-C50C-407E-A947-70E740481C1C}">
-                <a14:useLocalDpi xmlns:a14="http://schemas.microsoft.com/office/drawing/2010/main" val="0"/>
+                <a14:useLocalDpi xmlns:a14="http://schemas.microsoft.com/office/drawing/2010/main" xmlns="" val="0"/>
               </a:ext>
             </a:extLst>
           </a:blip>
@@ -3808,7 +3809,7 @@
           <a:noFill/>
           <a:extLst>
             <a:ext uri="{909E8E84-426E-40DD-AFC4-6F175D3DCCD1}">
-              <a14:hiddenFill xmlns:a14="http://schemas.microsoft.com/office/drawing/2010/main">
+              <a14:hiddenFill xmlns:a14="http://schemas.microsoft.com/office/drawing/2010/main" xmlns="">
                 <a:solidFill>
                   <a:srgbClr val="FFFFFF"/>
                 </a:solidFill>
@@ -3820,7 +3821,7 @@
     </p:spTree>
     <p:extLst>
       <p:ext uri="{BB962C8B-B14F-4D97-AF65-F5344CB8AC3E}">
-        <p14:creationId xmlns:p14="http://schemas.microsoft.com/office/powerpoint/2010/main" val="4177077622"/>
+        <p14:creationId xmlns:p14="http://schemas.microsoft.com/office/powerpoint/2010/main" xmlns="" val="4177077622"/>
       </p:ext>
     </p:extLst>
   </p:cSld>
@@ -4012,28 +4013,6 @@
       </p:sp>
       <p:sp>
         <p:nvSpPr>
-          <p:cNvPr id="6" name="Date Placeholder 5"/>
-          <p:cNvSpPr>
-            <a:spLocks noGrp="1"/>
-          </p:cNvSpPr>
-          <p:nvPr>
-            <p:ph type="dt" sz="half" idx="2"/>
-          </p:nvPr>
-        </p:nvSpPr>
-        <p:spPr/>
-        <p:txBody>
-          <a:bodyPr/>
-          <a:lstStyle/>
-          <a:p>
-            <a:r>
-              <a:rPr lang="en-CA" dirty="0"/>
-              <a:t>Winter 2022</a:t>
-            </a:r>
-          </a:p>
-        </p:txBody>
-      </p:sp>
-      <p:sp>
-        <p:nvSpPr>
           <p:cNvPr id="10" name="Footer Placeholder 9"/>
           <p:cNvSpPr>
             <a:spLocks noGrp="1"/>
@@ -4084,7 +4063,7 @@
     </p:spTree>
     <p:extLst>
       <p:ext uri="{BB962C8B-B14F-4D97-AF65-F5344CB8AC3E}">
-        <p14:creationId xmlns:p14="http://schemas.microsoft.com/office/powerpoint/2010/main" val="3107128514"/>
+        <p14:creationId xmlns:p14="http://schemas.microsoft.com/office/powerpoint/2010/main" xmlns="" val="3107128514"/>
       </p:ext>
     </p:extLst>
   </p:cSld>
@@ -4245,28 +4224,6 @@
       </p:sp>
       <p:sp>
         <p:nvSpPr>
-          <p:cNvPr id="6" name="Date Placeholder 5"/>
-          <p:cNvSpPr>
-            <a:spLocks noGrp="1"/>
-          </p:cNvSpPr>
-          <p:nvPr>
-            <p:ph type="dt" sz="half" idx="2"/>
-          </p:nvPr>
-        </p:nvSpPr>
-        <p:spPr/>
-        <p:txBody>
-          <a:bodyPr/>
-          <a:lstStyle/>
-          <a:p>
-            <a:r>
-              <a:rPr lang="en-CA" dirty="0"/>
-              <a:t>Winter 2022</a:t>
-            </a:r>
-          </a:p>
-        </p:txBody>
-      </p:sp>
-      <p:sp>
-        <p:nvSpPr>
           <p:cNvPr id="10" name="Footer Placeholder 9"/>
           <p:cNvSpPr>
             <a:spLocks noGrp="1"/>
@@ -4317,7 +4274,7 @@
     </p:spTree>
     <p:extLst>
       <p:ext uri="{BB962C8B-B14F-4D97-AF65-F5344CB8AC3E}">
-        <p14:creationId xmlns:p14="http://schemas.microsoft.com/office/powerpoint/2010/main" val="3996096411"/>
+        <p14:creationId xmlns:p14="http://schemas.microsoft.com/office/powerpoint/2010/main" xmlns="" val="3996096411"/>
       </p:ext>
     </p:extLst>
   </p:cSld>
@@ -4434,28 +4391,6 @@
       </p:sp>
       <p:sp>
         <p:nvSpPr>
-          <p:cNvPr id="6" name="Date Placeholder 5"/>
-          <p:cNvSpPr>
-            <a:spLocks noGrp="1"/>
-          </p:cNvSpPr>
-          <p:nvPr>
-            <p:ph type="dt" sz="half" idx="2"/>
-          </p:nvPr>
-        </p:nvSpPr>
-        <p:spPr/>
-        <p:txBody>
-          <a:bodyPr/>
-          <a:lstStyle/>
-          <a:p>
-            <a:r>
-              <a:rPr lang="en-CA" dirty="0"/>
-              <a:t>Winter 2022</a:t>
-            </a:r>
-          </a:p>
-        </p:txBody>
-      </p:sp>
-      <p:sp>
-        <p:nvSpPr>
           <p:cNvPr id="10" name="Footer Placeholder 9"/>
           <p:cNvSpPr>
             <a:spLocks noGrp="1"/>
@@ -4506,7 +4441,7 @@
     </p:spTree>
     <p:extLst>
       <p:ext uri="{BB962C8B-B14F-4D97-AF65-F5344CB8AC3E}">
-        <p14:creationId xmlns:p14="http://schemas.microsoft.com/office/powerpoint/2010/main" val="2833466338"/>
+        <p14:creationId xmlns:p14="http://schemas.microsoft.com/office/powerpoint/2010/main" xmlns="" val="2833466338"/>
       </p:ext>
     </p:extLst>
   </p:cSld>
@@ -4768,28 +4703,6 @@
       </p:sp>
       <p:sp>
         <p:nvSpPr>
-          <p:cNvPr id="6" name="Date Placeholder 5"/>
-          <p:cNvSpPr>
-            <a:spLocks noGrp="1"/>
-          </p:cNvSpPr>
-          <p:nvPr>
-            <p:ph type="dt" sz="half" idx="2"/>
-          </p:nvPr>
-        </p:nvSpPr>
-        <p:spPr/>
-        <p:txBody>
-          <a:bodyPr/>
-          <a:lstStyle/>
-          <a:p>
-            <a:r>
-              <a:rPr lang="en-CA" dirty="0"/>
-              <a:t>Winter 2022</a:t>
-            </a:r>
-          </a:p>
-        </p:txBody>
-      </p:sp>
-      <p:sp>
-        <p:nvSpPr>
           <p:cNvPr id="10" name="Footer Placeholder 9"/>
           <p:cNvSpPr>
             <a:spLocks noGrp="1"/>
@@ -4840,7 +4753,7 @@
     </p:spTree>
     <p:extLst>
       <p:ext uri="{BB962C8B-B14F-4D97-AF65-F5344CB8AC3E}">
-        <p14:creationId xmlns:p14="http://schemas.microsoft.com/office/powerpoint/2010/main" val="1437587282"/>
+        <p14:creationId xmlns:p14="http://schemas.microsoft.com/office/powerpoint/2010/main" xmlns="" val="1437587282"/>
       </p:ext>
     </p:extLst>
   </p:cSld>
@@ -4893,7 +4806,7 @@
     </a:clrScheme>
     <a:fontScheme name="Office">
       <a:majorFont>
-        <a:latin typeface="Calibri Light" panose="020F0302020204030204"/>
+        <a:latin typeface="Calibri Light"/>
         <a:ea typeface=""/>
         <a:cs typeface=""/>
         <a:font script="Jpan" typeface="游ゴシック Light"/>
@@ -4945,7 +4858,7 @@
         <a:font script="Tfng" typeface="Ebrima"/>
       </a:majorFont>
       <a:minorFont>
-        <a:latin typeface="Calibri" panose="020F0502020204030204"/>
+        <a:latin typeface="Calibri"/>
         <a:ea typeface=""/>
         <a:cs typeface=""/>
         <a:font script="Jpan" typeface="游ゴシック"/>
@@ -5139,7 +5052,7 @@
   <a:extraClrSchemeLst/>
   <a:extLst>
     <a:ext uri="{05A4C25C-085E-4340-85A3-A5531E510DB2}">
-      <thm15:themeFamily xmlns:thm15="http://schemas.microsoft.com/office/thememl/2012/main" name="eye_tracker_presentation" id="{00ED1D97-A04B-46A0-BB71-88655A6B057F}" vid="{F36189FA-3966-4852-951E-5734674D1C7B}"/>
+      <thm15:themeFamily xmlns:thm15="http://schemas.microsoft.com/office/thememl/2012/main" xmlns="" name="eye_tracker_presentation" id="{00ED1D97-A04B-46A0-BB71-88655A6B057F}" vid="{F36189FA-3966-4852-951E-5734674D1C7B}"/>
     </a:ext>
   </a:extLst>
 </a:theme>
@@ -5188,7 +5101,7 @@
     </a:clrScheme>
     <a:fontScheme name="Office">
       <a:majorFont>
-        <a:latin typeface="Calibri Light" panose="020F0302020204030204"/>
+        <a:latin typeface="Calibri Light"/>
         <a:ea typeface=""/>
         <a:cs typeface=""/>
         <a:font script="Jpan" typeface="游ゴシック Light"/>
@@ -5240,7 +5153,7 @@
         <a:font script="Tfng" typeface="Ebrima"/>
       </a:majorFont>
       <a:minorFont>
-        <a:latin typeface="Calibri" panose="020F0502020204030204"/>
+        <a:latin typeface="Calibri"/>
         <a:ea typeface=""/>
         <a:cs typeface=""/>
         <a:font script="Jpan" typeface="游ゴシック"/>
@@ -5434,7 +5347,7 @@
   <a:extraClrSchemeLst/>
   <a:extLst>
     <a:ext uri="{05A4C25C-085E-4340-85A3-A5531E510DB2}">
-      <thm15:themeFamily xmlns:thm15="http://schemas.microsoft.com/office/thememl/2012/main" name="Office Theme" id="{62F939B6-93AF-4DB8-9C6B-D6C7DFDC589F}" vid="{4A3C46E8-61CC-4603-A589-7422A47A8E4A}"/>
+      <thm15:themeFamily xmlns:thm15="http://schemas.microsoft.com/office/thememl/2012/main" xmlns="" name="Office Theme" id="{62F939B6-93AF-4DB8-9C6B-D6C7DFDC589F}" vid="{4A3C46E8-61CC-4603-A589-7422A47A8E4A}"/>
     </a:ext>
   </a:extLst>
 </a:theme>

</xml_diff>